<commit_message>
Editer le powerpoint et le rapport
</commit_message>
<xml_diff>
--- a/Prototype-Pratique.pptx
+++ b/Prototype-Pratique.pptx
@@ -16885,7 +16885,7 @@
           <a:p>
             <a:fld id="{D635BA84-42E8-4463-95DD-BBF01969D626}" type="datetimeFigureOut">
               <a:rPr lang="fr-CH" smtClean="0"/>
-              <a:t>11.06.2019</a:t>
+              <a:t>12.06.2019</a:t>
             </a:fld>
             <a:endParaRPr lang="fr-CH"/>
           </a:p>
@@ -18630,7 +18630,7 @@
             <a:fld id="{B61BEF0D-F0BB-DE4B-95CE-6DB70DBA9567}" type="datetimeFigureOut">
               <a:rPr lang="en-US" dirty="0"/>
               <a:pPr/>
-              <a:t>6/11/2019</a:t>
+              <a:t>6/12/2019</a:t>
             </a:fld>
             <a:endParaRPr lang="en-US" dirty="0"/>
           </a:p>
@@ -18878,7 +18878,7 @@
             <a:fld id="{B61BEF0D-F0BB-DE4B-95CE-6DB70DBA9567}" type="datetimeFigureOut">
               <a:rPr lang="en-US" dirty="0"/>
               <a:pPr/>
-              <a:t>6/11/2019</a:t>
+              <a:t>6/12/2019</a:t>
             </a:fld>
             <a:endParaRPr lang="en-US" dirty="0"/>
           </a:p>
@@ -19189,7 +19189,7 @@
             <a:fld id="{B61BEF0D-F0BB-DE4B-95CE-6DB70DBA9567}" type="datetimeFigureOut">
               <a:rPr lang="en-US" dirty="0"/>
               <a:pPr/>
-              <a:t>6/11/2019</a:t>
+              <a:t>6/12/2019</a:t>
             </a:fld>
             <a:endParaRPr lang="en-US" dirty="0"/>
           </a:p>
@@ -19513,7 +19513,7 @@
             <a:fld id="{B61BEF0D-F0BB-DE4B-95CE-6DB70DBA9567}" type="datetimeFigureOut">
               <a:rPr lang="en-US" dirty="0"/>
               <a:pPr/>
-              <a:t>6/11/2019</a:t>
+              <a:t>6/12/2019</a:t>
             </a:fld>
             <a:endParaRPr lang="en-US" dirty="0"/>
           </a:p>
@@ -19824,7 +19824,7 @@
             <a:fld id="{B61BEF0D-F0BB-DE4B-95CE-6DB70DBA9567}" type="datetimeFigureOut">
               <a:rPr lang="en-US" dirty="0"/>
               <a:pPr/>
-              <a:t>6/11/2019</a:t>
+              <a:t>6/12/2019</a:t>
             </a:fld>
             <a:endParaRPr lang="en-US" dirty="0"/>
           </a:p>
@@ -20208,7 +20208,7 @@
             <a:fld id="{B61BEF0D-F0BB-DE4B-95CE-6DB70DBA9567}" type="datetimeFigureOut">
               <a:rPr lang="en-US" dirty="0"/>
               <a:pPr/>
-              <a:t>6/11/2019</a:t>
+              <a:t>6/12/2019</a:t>
             </a:fld>
             <a:endParaRPr lang="en-US" dirty="0"/>
           </a:p>
@@ -20374,7 +20374,7 @@
           <a:p>
             <a:fld id="{55C6B4A9-1611-4792-9094-5F34BCA07E0B}" type="datetimeFigureOut">
               <a:rPr lang="en-US" dirty="0"/>
-              <a:t>6/11/2019</a:t>
+              <a:t>6/12/2019</a:t>
             </a:fld>
             <a:endParaRPr lang="en-US" dirty="0"/>
           </a:p>
@@ -20550,7 +20550,7 @@
             <a:fld id="{B61BEF0D-F0BB-DE4B-95CE-6DB70DBA9567}" type="datetimeFigureOut">
               <a:rPr lang="en-US" dirty="0"/>
               <a:pPr/>
-              <a:t>6/11/2019</a:t>
+              <a:t>6/12/2019</a:t>
             </a:fld>
             <a:endParaRPr lang="en-US" dirty="0"/>
           </a:p>
@@ -20716,7 +20716,7 @@
           <a:p>
             <a:fld id="{42A54C80-263E-416B-A8E0-580EDEADCBDC}" type="datetimeFigureOut">
               <a:rPr lang="en-US" dirty="0"/>
-              <a:t>6/11/2019</a:t>
+              <a:t>6/12/2019</a:t>
             </a:fld>
             <a:endParaRPr lang="en-US" dirty="0"/>
           </a:p>
@@ -20959,7 +20959,7 @@
             <a:fld id="{B61BEF0D-F0BB-DE4B-95CE-6DB70DBA9567}" type="datetimeFigureOut">
               <a:rPr lang="en-US" dirty="0"/>
               <a:pPr/>
-              <a:t>6/11/2019</a:t>
+              <a:t>6/12/2019</a:t>
             </a:fld>
             <a:endParaRPr lang="en-US" dirty="0"/>
           </a:p>
@@ -21187,7 +21187,7 @@
           <a:p>
             <a:fld id="{42A54C80-263E-416B-A8E0-580EDEADCBDC}" type="datetimeFigureOut">
               <a:rPr lang="en-US" dirty="0"/>
-              <a:t>6/11/2019</a:t>
+              <a:t>6/12/2019</a:t>
             </a:fld>
             <a:endParaRPr lang="en-US" dirty="0"/>
           </a:p>
@@ -21557,7 +21557,7 @@
             <a:fld id="{B61BEF0D-F0BB-DE4B-95CE-6DB70DBA9567}" type="datetimeFigureOut">
               <a:rPr lang="en-US" dirty="0"/>
               <a:pPr/>
-              <a:t>6/11/2019</a:t>
+              <a:t>6/12/2019</a:t>
             </a:fld>
             <a:endParaRPr lang="en-US" dirty="0"/>
           </a:p>
@@ -21677,7 +21677,7 @@
             <a:fld id="{B61BEF0D-F0BB-DE4B-95CE-6DB70DBA9567}" type="datetimeFigureOut">
               <a:rPr lang="en-US" dirty="0"/>
               <a:pPr/>
-              <a:t>6/11/2019</a:t>
+              <a:t>6/12/2019</a:t>
             </a:fld>
             <a:endParaRPr lang="en-US" dirty="0"/>
           </a:p>
@@ -21769,7 +21769,7 @@
             <a:fld id="{B61BEF0D-F0BB-DE4B-95CE-6DB70DBA9567}" type="datetimeFigureOut">
               <a:rPr lang="en-US" dirty="0"/>
               <a:pPr/>
-              <a:t>6/11/2019</a:t>
+              <a:t>6/12/2019</a:t>
             </a:fld>
             <a:endParaRPr lang="en-US" dirty="0"/>
           </a:p>
@@ -22020,7 +22020,7 @@
           <a:p>
             <a:fld id="{42A54C80-263E-416B-A8E0-580EDEADCBDC}" type="datetimeFigureOut">
               <a:rPr lang="en-US" dirty="0"/>
-              <a:t>6/11/2019</a:t>
+              <a:t>6/12/2019</a:t>
             </a:fld>
             <a:endParaRPr lang="en-US" dirty="0"/>
           </a:p>
@@ -22279,7 +22279,7 @@
             <a:fld id="{B61BEF0D-F0BB-DE4B-95CE-6DB70DBA9567}" type="datetimeFigureOut">
               <a:rPr lang="en-US" dirty="0"/>
               <a:pPr/>
-              <a:t>6/11/2019</a:t>
+              <a:t>6/12/2019</a:t>
             </a:fld>
             <a:endParaRPr lang="en-US" dirty="0"/>
           </a:p>
@@ -23021,7 +23021,7 @@
             <a:fld id="{B61BEF0D-F0BB-DE4B-95CE-6DB70DBA9567}" type="datetimeFigureOut">
               <a:rPr lang="en-US" dirty="0"/>
               <a:pPr/>
-              <a:t>6/11/2019</a:t>
+              <a:t>6/12/2019</a:t>
             </a:fld>
             <a:endParaRPr lang="en-US" dirty="0"/>
           </a:p>
@@ -28283,6 +28283,60 @@
           </a:prstGeom>
         </p:spPr>
       </p:pic>
+      <p:sp>
+        <p:nvSpPr>
+          <p:cNvPr id="3" name="Rectangle 2">
+            <a:extLst>
+              <a:ext uri="{FF2B5EF4-FFF2-40B4-BE49-F238E27FC236}">
+                <a16:creationId xmlns:a16="http://schemas.microsoft.com/office/drawing/2014/main" id="{76917A69-4012-4620-936A-B98780390C9A}"/>
+              </a:ext>
+            </a:extLst>
+          </p:cNvPr>
+          <p:cNvSpPr/>
+          <p:nvPr/>
+        </p:nvSpPr>
+        <p:spPr>
+          <a:xfrm>
+            <a:off x="5018049" y="4761571"/>
+            <a:ext cx="1077951" cy="624468"/>
+          </a:xfrm>
+          <a:prstGeom prst="rect">
+            <a:avLst/>
+          </a:prstGeom>
+          <a:solidFill>
+            <a:schemeClr val="bg1"/>
+          </a:solidFill>
+          <a:ln>
+            <a:solidFill>
+              <a:schemeClr val="bg1"/>
+            </a:solidFill>
+          </a:ln>
+        </p:spPr>
+        <p:style>
+          <a:lnRef idx="2">
+            <a:schemeClr val="accent1">
+              <a:shade val="50000"/>
+            </a:schemeClr>
+          </a:lnRef>
+          <a:fillRef idx="1">
+            <a:schemeClr val="accent1"/>
+          </a:fillRef>
+          <a:effectRef idx="0">
+            <a:schemeClr val="accent1"/>
+          </a:effectRef>
+          <a:fontRef idx="minor">
+            <a:schemeClr val="lt1"/>
+          </a:fontRef>
+        </p:style>
+        <p:txBody>
+          <a:bodyPr rtlCol="0" anchor="ctr"/>
+          <a:lstStyle/>
+          <a:p>
+            <a:pPr algn="ctr"/>
+            <a:endParaRPr lang="fr-CH"/>
+          </a:p>
+        </p:txBody>
+      </p:sp>
       <p:pic>
         <p:nvPicPr>
           <p:cNvPr id="21" name="Image 20">
@@ -28305,7 +28359,7 @@
         </p:blipFill>
         <p:spPr>
           <a:xfrm>
-            <a:off x="4867079" y="4108944"/>
+            <a:off x="4883408" y="4187003"/>
             <a:ext cx="1498592" cy="1546934"/>
           </a:xfrm>
           <a:prstGeom prst="rect">
@@ -28323,6 +28377,77 @@
   <p:clrMapOvr>
     <a:masterClrMapping/>
   </p:clrMapOvr>
+  <p:timing>
+    <p:tnLst>
+      <p:par>
+        <p:cTn id="1" dur="indefinite" restart="never" nodeType="tmRoot">
+          <p:childTnLst>
+            <p:seq concurrent="1" nextAc="seek">
+              <p:cTn id="2" dur="indefinite" nodeType="mainSeq">
+                <p:childTnLst>
+                  <p:par>
+                    <p:cTn id="3" fill="hold">
+                      <p:stCondLst>
+                        <p:cond delay="indefinite"/>
+                        <p:cond evt="onBegin" delay="0">
+                          <p:tn val="2"/>
+                        </p:cond>
+                      </p:stCondLst>
+                      <p:childTnLst>
+                        <p:par>
+                          <p:cTn id="4" fill="hold">
+                            <p:stCondLst>
+                              <p:cond delay="0"/>
+                            </p:stCondLst>
+                            <p:childTnLst>
+                              <p:par>
+                                <p:cTn id="5" presetID="8" presetClass="emph" presetSubtype="0" repeatCount="indefinite" fill="hold" nodeType="withEffect">
+                                  <p:stCondLst>
+                                    <p:cond delay="0"/>
+                                  </p:stCondLst>
+                                  <p:childTnLst>
+                                    <p:animRot by="21600000">
+                                      <p:cBhvr>
+                                        <p:cTn id="6" dur="2000" fill="hold"/>
+                                        <p:tgtEl>
+                                          <p:spTgt spid="21"/>
+                                        </p:tgtEl>
+                                        <p:attrNameLst>
+                                          <p:attrName>r</p:attrName>
+                                        </p:attrNameLst>
+                                      </p:cBhvr>
+                                    </p:animRot>
+                                  </p:childTnLst>
+                                </p:cTn>
+                              </p:par>
+                            </p:childTnLst>
+                          </p:cTn>
+                        </p:par>
+                      </p:childTnLst>
+                    </p:cTn>
+                  </p:par>
+                </p:childTnLst>
+              </p:cTn>
+              <p:prevCondLst>
+                <p:cond evt="onPrev" delay="0">
+                  <p:tgtEl>
+                    <p:sldTgt/>
+                  </p:tgtEl>
+                </p:cond>
+              </p:prevCondLst>
+              <p:nextCondLst>
+                <p:cond evt="onNext" delay="0">
+                  <p:tgtEl>
+                    <p:sldTgt/>
+                  </p:tgtEl>
+                </p:cond>
+              </p:nextCondLst>
+            </p:seq>
+          </p:childTnLst>
+        </p:cTn>
+      </p:par>
+    </p:tnLst>
+  </p:timing>
 </p:sld>
 </file>
 

</xml_diff>